<commit_message>
Doc updates per partner
</commit_message>
<xml_diff>
--- a/docs/deployment_guide/images/ibm-liberty-eks-architecture_diagram.pptx
+++ b/docs/deployment_guide/images/ibm-liberty-eks-architecture_diagram.pptx
@@ -212,7 +212,7 @@
           <a:p>
             <a:fld id="{3D24F5CC-F88F-2E40-B1E3-1BEBDB4FB352}" type="datetimeFigureOut">
               <a:rPr lang="en-US" smtClean="0"/>
-              <a:t>11/30/2022</a:t>
+              <a:t>12/6/2022</a:t>
             </a:fld>
             <a:endParaRPr lang="en-US" dirty="0"/>
           </a:p>
@@ -898,7 +898,7 @@
           <a:p>
             <a:fld id="{42CEB043-CB07-4D88-96C7-E080C34C29C0}" type="datetimeFigureOut">
               <a:rPr lang="en-US" smtClean="0"/>
-              <a:t>11/30/2022</a:t>
+              <a:t>12/6/2022</a:t>
             </a:fld>
             <a:endParaRPr lang="en-US" dirty="0"/>
           </a:p>
@@ -1068,7 +1068,7 @@
           <a:p>
             <a:fld id="{42CEB043-CB07-4D88-96C7-E080C34C29C0}" type="datetimeFigureOut">
               <a:rPr lang="en-US" smtClean="0"/>
-              <a:t>11/30/2022</a:t>
+              <a:t>12/6/2022</a:t>
             </a:fld>
             <a:endParaRPr lang="en-US" dirty="0"/>
           </a:p>
@@ -1248,7 +1248,7 @@
           <a:p>
             <a:fld id="{42CEB043-CB07-4D88-96C7-E080C34C29C0}" type="datetimeFigureOut">
               <a:rPr lang="en-US" smtClean="0"/>
-              <a:t>11/30/2022</a:t>
+              <a:t>12/6/2022</a:t>
             </a:fld>
             <a:endParaRPr lang="en-US" dirty="0"/>
           </a:p>
@@ -1418,7 +1418,7 @@
           <a:p>
             <a:fld id="{42CEB043-CB07-4D88-96C7-E080C34C29C0}" type="datetimeFigureOut">
               <a:rPr lang="en-US" smtClean="0"/>
-              <a:t>11/30/2022</a:t>
+              <a:t>12/6/2022</a:t>
             </a:fld>
             <a:endParaRPr lang="en-US" dirty="0"/>
           </a:p>
@@ -1662,7 +1662,7 @@
           <a:p>
             <a:fld id="{42CEB043-CB07-4D88-96C7-E080C34C29C0}" type="datetimeFigureOut">
               <a:rPr lang="en-US" smtClean="0"/>
-              <a:t>11/30/2022</a:t>
+              <a:t>12/6/2022</a:t>
             </a:fld>
             <a:endParaRPr lang="en-US" dirty="0"/>
           </a:p>
@@ -1894,7 +1894,7 @@
           <a:p>
             <a:fld id="{42CEB043-CB07-4D88-96C7-E080C34C29C0}" type="datetimeFigureOut">
               <a:rPr lang="en-US" smtClean="0"/>
-              <a:t>11/30/2022</a:t>
+              <a:t>12/6/2022</a:t>
             </a:fld>
             <a:endParaRPr lang="en-US" dirty="0"/>
           </a:p>
@@ -2261,7 +2261,7 @@
           <a:p>
             <a:fld id="{42CEB043-CB07-4D88-96C7-E080C34C29C0}" type="datetimeFigureOut">
               <a:rPr lang="en-US" smtClean="0"/>
-              <a:t>11/30/2022</a:t>
+              <a:t>12/6/2022</a:t>
             </a:fld>
             <a:endParaRPr lang="en-US" dirty="0"/>
           </a:p>
@@ -2379,7 +2379,7 @@
           <a:p>
             <a:fld id="{42CEB043-CB07-4D88-96C7-E080C34C29C0}" type="datetimeFigureOut">
               <a:rPr lang="en-US" smtClean="0"/>
-              <a:t>11/30/2022</a:t>
+              <a:t>12/6/2022</a:t>
             </a:fld>
             <a:endParaRPr lang="en-US" dirty="0"/>
           </a:p>
@@ -2474,7 +2474,7 @@
           <a:p>
             <a:fld id="{42CEB043-CB07-4D88-96C7-E080C34C29C0}" type="datetimeFigureOut">
               <a:rPr lang="en-US" smtClean="0"/>
-              <a:t>11/30/2022</a:t>
+              <a:t>12/6/2022</a:t>
             </a:fld>
             <a:endParaRPr lang="en-US" dirty="0"/>
           </a:p>
@@ -2751,7 +2751,7 @@
           <a:p>
             <a:fld id="{42CEB043-CB07-4D88-96C7-E080C34C29C0}" type="datetimeFigureOut">
               <a:rPr lang="en-US" smtClean="0"/>
-              <a:t>11/30/2022</a:t>
+              <a:t>12/6/2022</a:t>
             </a:fld>
             <a:endParaRPr lang="en-US" dirty="0"/>
           </a:p>
@@ -3007,7 +3007,7 @@
           <a:p>
             <a:fld id="{42CEB043-CB07-4D88-96C7-E080C34C29C0}" type="datetimeFigureOut">
               <a:rPr lang="en-US" smtClean="0"/>
-              <a:t>11/30/2022</a:t>
+              <a:t>12/6/2022</a:t>
             </a:fld>
             <a:endParaRPr lang="en-US" dirty="0"/>
           </a:p>
@@ -3220,7 +3220,7 @@
           <a:p>
             <a:fld id="{42CEB043-CB07-4D88-96C7-E080C34C29C0}" type="datetimeFigureOut">
               <a:rPr lang="en-US" smtClean="0"/>
-              <a:t>11/30/2022</a:t>
+              <a:t>12/6/2022</a:t>
             </a:fld>
             <a:endParaRPr lang="en-US" dirty="0"/>
           </a:p>
@@ -4439,198 +4439,12 @@
           </a:prstGeom>
         </p:spPr>
       </p:pic>
-      <p:sp>
-        <p:nvSpPr>
-          <p:cNvPr id="93" name="TextBox 26">
-            <a:extLst>
-              <a:ext uri="{FF2B5EF4-FFF2-40B4-BE49-F238E27FC236}">
-                <a16:creationId xmlns:a16="http://schemas.microsoft.com/office/drawing/2014/main" id="{9CA3689B-0EEE-495D-8754-D5EF4140936B}"/>
-              </a:ext>
-            </a:extLst>
-          </p:cNvPr>
-          <p:cNvSpPr txBox="1">
-            <a:spLocks noChangeArrowheads="1"/>
-          </p:cNvSpPr>
-          <p:nvPr/>
-        </p:nvSpPr>
-        <p:spPr bwMode="auto">
-          <a:xfrm>
-            <a:off x="2252111" y="6494005"/>
-            <a:ext cx="1847848" cy="261610"/>
-          </a:xfrm>
-          <a:prstGeom prst="rect">
-            <a:avLst/>
-          </a:prstGeom>
-          <a:noFill/>
-          <a:ln>
-            <a:noFill/>
-          </a:ln>
-          <a:extLst>
-            <a:ext uri="{909E8E84-426E-40DD-AFC4-6F175D3DCCD1}">
-              <a14:hiddenFill xmlns:a14="http://schemas.microsoft.com/office/drawing/2010/main">
-                <a:solidFill>
-                  <a:srgbClr val="FFFFFF"/>
-                </a:solidFill>
-              </a14:hiddenFill>
-            </a:ext>
-            <a:ext uri="{91240B29-F687-4F45-9708-019B960494DF}">
-              <a14:hiddenLine xmlns:a14="http://schemas.microsoft.com/office/drawing/2010/main" w="9525">
-                <a:solidFill>
-                  <a:srgbClr val="000000"/>
-                </a:solidFill>
-                <a:miter lim="800000"/>
-                <a:headEnd/>
-                <a:tailEnd/>
-              </a14:hiddenLine>
-            </a:ext>
-          </a:extLst>
-        </p:spPr>
-        <p:txBody>
-          <a:bodyPr wrap="square" lIns="0" rIns="0">
-            <a:spAutoFit/>
-          </a:bodyPr>
-          <a:lstStyle>
-            <a:lvl1pPr>
-              <a:defRPr>
-                <a:solidFill>
-                  <a:schemeClr val="tx1"/>
-                </a:solidFill>
-                <a:latin typeface="Calibri" panose="020F0502020204030204" pitchFamily="34" charset="0"/>
-              </a:defRPr>
-            </a:lvl1pPr>
-            <a:lvl2pPr marL="742950" indent="-285750">
-              <a:defRPr>
-                <a:solidFill>
-                  <a:schemeClr val="tx1"/>
-                </a:solidFill>
-                <a:latin typeface="Calibri" panose="020F0502020204030204" pitchFamily="34" charset="0"/>
-              </a:defRPr>
-            </a:lvl2pPr>
-            <a:lvl3pPr marL="1143000" indent="-228600">
-              <a:defRPr>
-                <a:solidFill>
-                  <a:schemeClr val="tx1"/>
-                </a:solidFill>
-                <a:latin typeface="Calibri" panose="020F0502020204030204" pitchFamily="34" charset="0"/>
-              </a:defRPr>
-            </a:lvl3pPr>
-            <a:lvl4pPr marL="1600200" indent="-228600">
-              <a:defRPr>
-                <a:solidFill>
-                  <a:schemeClr val="tx1"/>
-                </a:solidFill>
-                <a:latin typeface="Calibri" panose="020F0502020204030204" pitchFamily="34" charset="0"/>
-              </a:defRPr>
-            </a:lvl4pPr>
-            <a:lvl5pPr marL="2057400" indent="-228600">
-              <a:defRPr>
-                <a:solidFill>
-                  <a:schemeClr val="tx1"/>
-                </a:solidFill>
-                <a:latin typeface="Calibri" panose="020F0502020204030204" pitchFamily="34" charset="0"/>
-              </a:defRPr>
-            </a:lvl5pPr>
-            <a:lvl6pPr marL="2514600" indent="-228600" eaLnBrk="0" fontAlgn="base" hangingPunct="0">
-              <a:spcBef>
-                <a:spcPct val="0"/>
-              </a:spcBef>
-              <a:spcAft>
-                <a:spcPct val="0"/>
-              </a:spcAft>
-              <a:defRPr>
-                <a:solidFill>
-                  <a:schemeClr val="tx1"/>
-                </a:solidFill>
-                <a:latin typeface="Calibri" panose="020F0502020204030204" pitchFamily="34" charset="0"/>
-              </a:defRPr>
-            </a:lvl6pPr>
-            <a:lvl7pPr marL="2971800" indent="-228600" eaLnBrk="0" fontAlgn="base" hangingPunct="0">
-              <a:spcBef>
-                <a:spcPct val="0"/>
-              </a:spcBef>
-              <a:spcAft>
-                <a:spcPct val="0"/>
-              </a:spcAft>
-              <a:defRPr>
-                <a:solidFill>
-                  <a:schemeClr val="tx1"/>
-                </a:solidFill>
-                <a:latin typeface="Calibri" panose="020F0502020204030204" pitchFamily="34" charset="0"/>
-              </a:defRPr>
-            </a:lvl7pPr>
-            <a:lvl8pPr marL="3429000" indent="-228600" eaLnBrk="0" fontAlgn="base" hangingPunct="0">
-              <a:spcBef>
-                <a:spcPct val="0"/>
-              </a:spcBef>
-              <a:spcAft>
-                <a:spcPct val="0"/>
-              </a:spcAft>
-              <a:defRPr>
-                <a:solidFill>
-                  <a:schemeClr val="tx1"/>
-                </a:solidFill>
-                <a:latin typeface="Calibri" panose="020F0502020204030204" pitchFamily="34" charset="0"/>
-              </a:defRPr>
-            </a:lvl8pPr>
-            <a:lvl9pPr marL="3886200" indent="-228600" eaLnBrk="0" fontAlgn="base" hangingPunct="0">
-              <a:spcBef>
-                <a:spcPct val="0"/>
-              </a:spcBef>
-              <a:spcAft>
-                <a:spcPct val="0"/>
-              </a:spcAft>
-              <a:defRPr>
-                <a:solidFill>
-                  <a:schemeClr val="tx1"/>
-                </a:solidFill>
-                <a:latin typeface="Calibri" panose="020F0502020204030204" pitchFamily="34" charset="0"/>
-              </a:defRPr>
-            </a:lvl9pPr>
-          </a:lstStyle>
-          <a:p>
-            <a:pPr marL="0" marR="0" lvl="0" indent="0" algn="ctr" defTabSz="457200" rtl="0" eaLnBrk="1" fontAlgn="auto" latinLnBrk="0" hangingPunct="1">
-              <a:lnSpc>
-                <a:spcPct val="100000"/>
-              </a:lnSpc>
-              <a:spcBef>
-                <a:spcPts val="0"/>
-              </a:spcBef>
-              <a:spcAft>
-                <a:spcPts val="0"/>
-              </a:spcAft>
-              <a:buClrTx/>
-              <a:buSzTx/>
-              <a:buFontTx/>
-              <a:buNone/>
-              <a:tabLst/>
-              <a:defRPr/>
-            </a:pPr>
-            <a:r>
-              <a:rPr kumimoji="0" lang="en-US" altLang="en-US" sz="1100" b="0" i="0" u="none" strike="noStrike" kern="1200" cap="none" spc="0" normalizeH="0" baseline="0" noProof="0" dirty="0">
-                <a:ln>
-                  <a:noFill/>
-                </a:ln>
-                <a:solidFill>
-                  <a:prstClr val="black"/>
-                </a:solidFill>
-                <a:effectLst/>
-                <a:uLnTx/>
-                <a:uFillTx/>
-                <a:latin typeface="Arial" panose="020B0604020202020204" pitchFamily="34" charset="0"/>
-                <a:ea typeface="Amazon Ember" panose="020B0603020204020204" pitchFamily="34" charset="0"/>
-                <a:cs typeface="Arial" panose="020B0604020202020204" pitchFamily="34" charset="0"/>
-              </a:rPr>
-              <a:t>WebSphere Liberty operator</a:t>
-            </a:r>
-          </a:p>
-        </p:txBody>
-      </p:sp>
       <p:pic>
         <p:nvPicPr>
-          <p:cNvPr id="94" name="Graphic 34">
+          <p:cNvPr id="95" name="Graphic 60">
             <a:extLst>
               <a:ext uri="{FF2B5EF4-FFF2-40B4-BE49-F238E27FC236}">
-                <a16:creationId xmlns:a16="http://schemas.microsoft.com/office/drawing/2014/main" id="{0F26936B-2228-40BB-85E3-6227A576C394}"/>
+                <a16:creationId xmlns:a16="http://schemas.microsoft.com/office/drawing/2014/main" id="{A1BE6915-FD35-4B6B-B1F7-791A3F39911F}"/>
               </a:ext>
             </a:extLst>
           </p:cNvPr>
@@ -4641,66 +4455,6 @@
         </p:nvPicPr>
         <p:blipFill>
           <a:blip r:embed="rId12">
-            <a:extLst>
-              <a:ext uri="{28A0092B-C50C-407E-A947-70E740481C1C}">
-                <a14:useLocalDpi xmlns:a14="http://schemas.microsoft.com/office/drawing/2010/main" val="0"/>
-              </a:ext>
-            </a:extLst>
-          </a:blip>
-          <a:srcRect/>
-          <a:stretch>
-            <a:fillRect/>
-          </a:stretch>
-        </p:blipFill>
-        <p:spPr bwMode="auto">
-          <a:xfrm>
-            <a:off x="2947435" y="6114883"/>
-            <a:ext cx="457200" cy="457200"/>
-          </a:xfrm>
-          <a:prstGeom prst="rect">
-            <a:avLst/>
-          </a:prstGeom>
-          <a:noFill/>
-          <a:ln>
-            <a:noFill/>
-          </a:ln>
-          <a:extLst>
-            <a:ext uri="{909E8E84-426E-40DD-AFC4-6F175D3DCCD1}">
-              <a14:hiddenFill xmlns:a14="http://schemas.microsoft.com/office/drawing/2010/main">
-                <a:solidFill>
-                  <a:srgbClr val="FFFFFF"/>
-                </a:solidFill>
-              </a14:hiddenFill>
-            </a:ext>
-            <a:ext uri="{91240B29-F687-4F45-9708-019B960494DF}">
-              <a14:hiddenLine xmlns:a14="http://schemas.microsoft.com/office/drawing/2010/main" w="9525">
-                <a:solidFill>
-                  <a:srgbClr val="000000"/>
-                </a:solidFill>
-                <a:miter lim="800000"/>
-                <a:headEnd/>
-                <a:tailEnd/>
-              </a14:hiddenLine>
-            </a:ext>
-          </a:extLst>
-        </p:spPr>
-      </p:pic>
-      <p:pic>
-        <p:nvPicPr>
-          <p:cNvPr id="95" name="Graphic 60">
-            <a:extLst>
-              <a:ext uri="{FF2B5EF4-FFF2-40B4-BE49-F238E27FC236}">
-                <a16:creationId xmlns:a16="http://schemas.microsoft.com/office/drawing/2014/main" id="{A1BE6915-FD35-4B6B-B1F7-791A3F39911F}"/>
-              </a:ext>
-            </a:extLst>
-          </p:cNvPr>
-          <p:cNvPicPr>
-            <a:picLocks noChangeAspect="1" noChangeArrowheads="1"/>
-          </p:cNvPicPr>
-          <p:nvPr/>
-        </p:nvPicPr>
-        <p:blipFill>
-          <a:blip r:embed="rId13">
             <a:extLst>
               <a:ext uri="{28A0092B-C50C-407E-A947-70E740481C1C}">
                 <a14:useLocalDpi xmlns:a14="http://schemas.microsoft.com/office/drawing/2010/main" val="0"/>
@@ -4946,7 +4700,7 @@
           <p:nvPr/>
         </p:nvPicPr>
         <p:blipFill>
-          <a:blip r:embed="rId14">
+          <a:blip r:embed="rId13">
             <a:extLst>
               <a:ext uri="{28A0092B-C50C-407E-A947-70E740481C1C}">
                 <a14:useLocalDpi xmlns:a14="http://schemas.microsoft.com/office/drawing/2010/main" val="0"/>
@@ -4960,7 +4714,7 @@
         </p:blipFill>
         <p:spPr bwMode="auto">
           <a:xfrm>
-            <a:off x="2947435" y="5474312"/>
+            <a:off x="2947435" y="6053855"/>
             <a:ext cx="457200" cy="457200"/>
           </a:xfrm>
           <a:prstGeom prst="rect">
@@ -5007,7 +4761,7 @@
         </p:nvSpPr>
         <p:spPr bwMode="auto">
           <a:xfrm>
-            <a:off x="2386429" y="5815376"/>
+            <a:off x="2386429" y="6429744"/>
             <a:ext cx="1579213" cy="261610"/>
           </a:xfrm>
           <a:prstGeom prst="rect">
@@ -5274,10 +5028,10 @@
           <p:nvPr/>
         </p:nvPicPr>
         <p:blipFill>
-          <a:blip r:embed="rId15">
+          <a:blip r:embed="rId14">
             <a:extLst>
               <a:ext uri="{96DAC541-7B7A-43D3-8B79-37D633B846F1}">
-                <asvg:svgBlip xmlns:asvg="http://schemas.microsoft.com/office/drawing/2016/SVG/main" r:embed="rId16"/>
+                <asvg:svgBlip xmlns:asvg="http://schemas.microsoft.com/office/drawing/2016/SVG/main" r:embed="rId15"/>
               </a:ext>
             </a:extLst>
           </a:blip>
@@ -5872,198 +5626,12 @@
           </a:prstGeom>
         </p:spPr>
       </p:pic>
-      <p:sp>
-        <p:nvSpPr>
-          <p:cNvPr id="190" name="TextBox 26">
-            <a:extLst>
-              <a:ext uri="{FF2B5EF4-FFF2-40B4-BE49-F238E27FC236}">
-                <a16:creationId xmlns:a16="http://schemas.microsoft.com/office/drawing/2014/main" id="{AE0B246D-4B18-4053-9DF7-17875AEC8011}"/>
-              </a:ext>
-            </a:extLst>
-          </p:cNvPr>
-          <p:cNvSpPr txBox="1">
-            <a:spLocks noChangeArrowheads="1"/>
-          </p:cNvSpPr>
-          <p:nvPr/>
-        </p:nvSpPr>
-        <p:spPr bwMode="auto">
-          <a:xfrm>
-            <a:off x="6286928" y="6494005"/>
-            <a:ext cx="1847848" cy="261610"/>
-          </a:xfrm>
-          <a:prstGeom prst="rect">
-            <a:avLst/>
-          </a:prstGeom>
-          <a:noFill/>
-          <a:ln>
-            <a:noFill/>
-          </a:ln>
-          <a:extLst>
-            <a:ext uri="{909E8E84-426E-40DD-AFC4-6F175D3DCCD1}">
-              <a14:hiddenFill xmlns:a14="http://schemas.microsoft.com/office/drawing/2010/main">
-                <a:solidFill>
-                  <a:srgbClr val="FFFFFF"/>
-                </a:solidFill>
-              </a14:hiddenFill>
-            </a:ext>
-            <a:ext uri="{91240B29-F687-4F45-9708-019B960494DF}">
-              <a14:hiddenLine xmlns:a14="http://schemas.microsoft.com/office/drawing/2010/main" w="9525">
-                <a:solidFill>
-                  <a:srgbClr val="000000"/>
-                </a:solidFill>
-                <a:miter lim="800000"/>
-                <a:headEnd/>
-                <a:tailEnd/>
-              </a14:hiddenLine>
-            </a:ext>
-          </a:extLst>
-        </p:spPr>
-        <p:txBody>
-          <a:bodyPr wrap="square" lIns="0" rIns="0">
-            <a:spAutoFit/>
-          </a:bodyPr>
-          <a:lstStyle>
-            <a:lvl1pPr>
-              <a:defRPr>
-                <a:solidFill>
-                  <a:schemeClr val="tx1"/>
-                </a:solidFill>
-                <a:latin typeface="Calibri" panose="020F0502020204030204" pitchFamily="34" charset="0"/>
-              </a:defRPr>
-            </a:lvl1pPr>
-            <a:lvl2pPr marL="742950" indent="-285750">
-              <a:defRPr>
-                <a:solidFill>
-                  <a:schemeClr val="tx1"/>
-                </a:solidFill>
-                <a:latin typeface="Calibri" panose="020F0502020204030204" pitchFamily="34" charset="0"/>
-              </a:defRPr>
-            </a:lvl2pPr>
-            <a:lvl3pPr marL="1143000" indent="-228600">
-              <a:defRPr>
-                <a:solidFill>
-                  <a:schemeClr val="tx1"/>
-                </a:solidFill>
-                <a:latin typeface="Calibri" panose="020F0502020204030204" pitchFamily="34" charset="0"/>
-              </a:defRPr>
-            </a:lvl3pPr>
-            <a:lvl4pPr marL="1600200" indent="-228600">
-              <a:defRPr>
-                <a:solidFill>
-                  <a:schemeClr val="tx1"/>
-                </a:solidFill>
-                <a:latin typeface="Calibri" panose="020F0502020204030204" pitchFamily="34" charset="0"/>
-              </a:defRPr>
-            </a:lvl4pPr>
-            <a:lvl5pPr marL="2057400" indent="-228600">
-              <a:defRPr>
-                <a:solidFill>
-                  <a:schemeClr val="tx1"/>
-                </a:solidFill>
-                <a:latin typeface="Calibri" panose="020F0502020204030204" pitchFamily="34" charset="0"/>
-              </a:defRPr>
-            </a:lvl5pPr>
-            <a:lvl6pPr marL="2514600" indent="-228600" eaLnBrk="0" fontAlgn="base" hangingPunct="0">
-              <a:spcBef>
-                <a:spcPct val="0"/>
-              </a:spcBef>
-              <a:spcAft>
-                <a:spcPct val="0"/>
-              </a:spcAft>
-              <a:defRPr>
-                <a:solidFill>
-                  <a:schemeClr val="tx1"/>
-                </a:solidFill>
-                <a:latin typeface="Calibri" panose="020F0502020204030204" pitchFamily="34" charset="0"/>
-              </a:defRPr>
-            </a:lvl6pPr>
-            <a:lvl7pPr marL="2971800" indent="-228600" eaLnBrk="0" fontAlgn="base" hangingPunct="0">
-              <a:spcBef>
-                <a:spcPct val="0"/>
-              </a:spcBef>
-              <a:spcAft>
-                <a:spcPct val="0"/>
-              </a:spcAft>
-              <a:defRPr>
-                <a:solidFill>
-                  <a:schemeClr val="tx1"/>
-                </a:solidFill>
-                <a:latin typeface="Calibri" panose="020F0502020204030204" pitchFamily="34" charset="0"/>
-              </a:defRPr>
-            </a:lvl7pPr>
-            <a:lvl8pPr marL="3429000" indent="-228600" eaLnBrk="0" fontAlgn="base" hangingPunct="0">
-              <a:spcBef>
-                <a:spcPct val="0"/>
-              </a:spcBef>
-              <a:spcAft>
-                <a:spcPct val="0"/>
-              </a:spcAft>
-              <a:defRPr>
-                <a:solidFill>
-                  <a:schemeClr val="tx1"/>
-                </a:solidFill>
-                <a:latin typeface="Calibri" panose="020F0502020204030204" pitchFamily="34" charset="0"/>
-              </a:defRPr>
-            </a:lvl8pPr>
-            <a:lvl9pPr marL="3886200" indent="-228600" eaLnBrk="0" fontAlgn="base" hangingPunct="0">
-              <a:spcBef>
-                <a:spcPct val="0"/>
-              </a:spcBef>
-              <a:spcAft>
-                <a:spcPct val="0"/>
-              </a:spcAft>
-              <a:defRPr>
-                <a:solidFill>
-                  <a:schemeClr val="tx1"/>
-                </a:solidFill>
-                <a:latin typeface="Calibri" panose="020F0502020204030204" pitchFamily="34" charset="0"/>
-              </a:defRPr>
-            </a:lvl9pPr>
-          </a:lstStyle>
-          <a:p>
-            <a:pPr marL="0" marR="0" lvl="0" indent="0" algn="ctr" defTabSz="457200" rtl="0" eaLnBrk="1" fontAlgn="auto" latinLnBrk="0" hangingPunct="1">
-              <a:lnSpc>
-                <a:spcPct val="100000"/>
-              </a:lnSpc>
-              <a:spcBef>
-                <a:spcPts val="0"/>
-              </a:spcBef>
-              <a:spcAft>
-                <a:spcPts val="0"/>
-              </a:spcAft>
-              <a:buClrTx/>
-              <a:buSzTx/>
-              <a:buFontTx/>
-              <a:buNone/>
-              <a:tabLst/>
-              <a:defRPr/>
-            </a:pPr>
-            <a:r>
-              <a:rPr kumimoji="0" lang="en-US" altLang="en-US" sz="1100" b="0" i="0" u="none" strike="noStrike" kern="1200" cap="none" spc="0" normalizeH="0" baseline="0" noProof="0" dirty="0">
-                <a:ln>
-                  <a:noFill/>
-                </a:ln>
-                <a:solidFill>
-                  <a:prstClr val="black"/>
-                </a:solidFill>
-                <a:effectLst/>
-                <a:uLnTx/>
-                <a:uFillTx/>
-                <a:latin typeface="Arial" panose="020B0604020202020204" pitchFamily="34" charset="0"/>
-                <a:ea typeface="Amazon Ember" panose="020B0603020204020204" pitchFamily="34" charset="0"/>
-                <a:cs typeface="Arial" panose="020B0604020202020204" pitchFamily="34" charset="0"/>
-              </a:rPr>
-              <a:t>WebSphere Liberty operator</a:t>
-            </a:r>
-          </a:p>
-        </p:txBody>
-      </p:sp>
       <p:pic>
         <p:nvPicPr>
-          <p:cNvPr id="191" name="Graphic 34">
+          <p:cNvPr id="196" name="Graphic 32">
             <a:extLst>
               <a:ext uri="{FF2B5EF4-FFF2-40B4-BE49-F238E27FC236}">
-                <a16:creationId xmlns:a16="http://schemas.microsoft.com/office/drawing/2014/main" id="{2AEF4F6A-CB9F-4EC5-B278-5F0A6F447537}"/>
+                <a16:creationId xmlns:a16="http://schemas.microsoft.com/office/drawing/2014/main" id="{9C994937-1471-4A2B-8F97-74931C55BB88}"/>
               </a:ext>
             </a:extLst>
           </p:cNvPr>
@@ -6073,7 +5641,7 @@
           <p:nvPr/>
         </p:nvPicPr>
         <p:blipFill>
-          <a:blip r:embed="rId12">
+          <a:blip r:embed="rId13">
             <a:extLst>
               <a:ext uri="{28A0092B-C50C-407E-A947-70E740481C1C}">
                 <a14:useLocalDpi xmlns:a14="http://schemas.microsoft.com/office/drawing/2010/main" val="0"/>
@@ -6087,67 +5655,7 @@
         </p:blipFill>
         <p:spPr bwMode="auto">
           <a:xfrm>
-            <a:off x="6982252" y="6105934"/>
-            <a:ext cx="457200" cy="457200"/>
-          </a:xfrm>
-          <a:prstGeom prst="rect">
-            <a:avLst/>
-          </a:prstGeom>
-          <a:noFill/>
-          <a:ln>
-            <a:noFill/>
-          </a:ln>
-          <a:extLst>
-            <a:ext uri="{909E8E84-426E-40DD-AFC4-6F175D3DCCD1}">
-              <a14:hiddenFill xmlns:a14="http://schemas.microsoft.com/office/drawing/2010/main">
-                <a:solidFill>
-                  <a:srgbClr val="FFFFFF"/>
-                </a:solidFill>
-              </a14:hiddenFill>
-            </a:ext>
-            <a:ext uri="{91240B29-F687-4F45-9708-019B960494DF}">
-              <a14:hiddenLine xmlns:a14="http://schemas.microsoft.com/office/drawing/2010/main" w="9525">
-                <a:solidFill>
-                  <a:srgbClr val="000000"/>
-                </a:solidFill>
-                <a:miter lim="800000"/>
-                <a:headEnd/>
-                <a:tailEnd/>
-              </a14:hiddenLine>
-            </a:ext>
-          </a:extLst>
-        </p:spPr>
-      </p:pic>
-      <p:pic>
-        <p:nvPicPr>
-          <p:cNvPr id="196" name="Graphic 32">
-            <a:extLst>
-              <a:ext uri="{FF2B5EF4-FFF2-40B4-BE49-F238E27FC236}">
-                <a16:creationId xmlns:a16="http://schemas.microsoft.com/office/drawing/2014/main" id="{9C994937-1471-4A2B-8F97-74931C55BB88}"/>
-              </a:ext>
-            </a:extLst>
-          </p:cNvPr>
-          <p:cNvPicPr>
-            <a:picLocks noChangeAspect="1" noChangeArrowheads="1"/>
-          </p:cNvPicPr>
-          <p:nvPr/>
-        </p:nvPicPr>
-        <p:blipFill>
-          <a:blip r:embed="rId14">
-            <a:extLst>
-              <a:ext uri="{28A0092B-C50C-407E-A947-70E740481C1C}">
-                <a14:useLocalDpi xmlns:a14="http://schemas.microsoft.com/office/drawing/2010/main" val="0"/>
-              </a:ext>
-            </a:extLst>
-          </a:blip>
-          <a:srcRect/>
-          <a:stretch>
-            <a:fillRect/>
-          </a:stretch>
-        </p:blipFill>
-        <p:spPr bwMode="auto">
-          <a:xfrm>
-            <a:off x="6982252" y="5468066"/>
+            <a:off x="6982252" y="6053855"/>
             <a:ext cx="457200" cy="457200"/>
           </a:xfrm>
           <a:prstGeom prst="rect">
@@ -6275,10 +5783,10 @@
           <p:nvPr/>
         </p:nvPicPr>
         <p:blipFill>
-          <a:blip r:embed="rId15">
+          <a:blip r:embed="rId14">
             <a:extLst>
               <a:ext uri="{96DAC541-7B7A-43D3-8B79-37D633B846F1}">
-                <asvg:svgBlip xmlns:asvg="http://schemas.microsoft.com/office/drawing/2016/SVG/main" r:embed="rId16"/>
+                <asvg:svgBlip xmlns:asvg="http://schemas.microsoft.com/office/drawing/2016/SVG/main" r:embed="rId15"/>
               </a:ext>
             </a:extLst>
           </a:blip>
@@ -6312,7 +5820,7 @@
         </p:nvSpPr>
         <p:spPr bwMode="auto">
           <a:xfrm>
-            <a:off x="6574648" y="5833218"/>
+            <a:off x="6574648" y="6433295"/>
             <a:ext cx="1272408" cy="261610"/>
           </a:xfrm>
           <a:prstGeom prst="rect">
@@ -6683,7 +6191,7 @@
           <p:nvPr/>
         </p:nvPicPr>
         <p:blipFill>
-          <a:blip r:embed="rId17">
+          <a:blip r:embed="rId16">
             <a:extLst>
               <a:ext uri="{28A0092B-C50C-407E-A947-70E740481C1C}">
                 <a14:useLocalDpi xmlns:a14="http://schemas.microsoft.com/office/drawing/2010/main" val="0"/>
@@ -6929,7 +6437,7 @@
           <p:nvPr/>
         </p:nvPicPr>
         <p:blipFill>
-          <a:blip r:embed="rId18">
+          <a:blip r:embed="rId17">
             <a:extLst>
               <a:ext uri="{28A0092B-C50C-407E-A947-70E740481C1C}">
                 <a14:useLocalDpi xmlns:a14="http://schemas.microsoft.com/office/drawing/2010/main" val="0"/>
@@ -6989,7 +6497,7 @@
           <p:nvPr/>
         </p:nvPicPr>
         <p:blipFill>
-          <a:blip r:embed="rId14">
+          <a:blip r:embed="rId13">
             <a:extLst>
               <a:ext uri="{28A0092B-C50C-407E-A947-70E740481C1C}">
                 <a14:useLocalDpi xmlns:a14="http://schemas.microsoft.com/office/drawing/2010/main" val="0"/>
@@ -7003,7 +6511,7 @@
         </p:blipFill>
         <p:spPr bwMode="auto">
           <a:xfrm>
-            <a:off x="2947435" y="6715434"/>
+            <a:off x="2947435" y="6652616"/>
             <a:ext cx="457200" cy="457200"/>
           </a:xfrm>
           <a:prstGeom prst="rect">
@@ -7050,7 +6558,7 @@
         </p:nvSpPr>
         <p:spPr bwMode="auto">
           <a:xfrm>
-            <a:off x="2386429" y="7056498"/>
+            <a:off x="2386429" y="7013634"/>
             <a:ext cx="1579213" cy="261610"/>
           </a:xfrm>
           <a:prstGeom prst="rect">
@@ -7235,7 +6743,7 @@
           <p:nvPr/>
         </p:nvPicPr>
         <p:blipFill>
-          <a:blip r:embed="rId14">
+          <a:blip r:embed="rId13">
             <a:extLst>
               <a:ext uri="{28A0092B-C50C-407E-A947-70E740481C1C}">
                 <a14:useLocalDpi xmlns:a14="http://schemas.microsoft.com/office/drawing/2010/main" val="0"/>
@@ -7249,7 +6757,7 @@
         </p:blipFill>
         <p:spPr bwMode="auto">
           <a:xfrm>
-            <a:off x="6982252" y="6709768"/>
+            <a:off x="6982252" y="6652616"/>
             <a:ext cx="457200" cy="457200"/>
           </a:xfrm>
           <a:prstGeom prst="rect">
@@ -7296,7 +6804,7 @@
         </p:nvSpPr>
         <p:spPr bwMode="auto">
           <a:xfrm>
-            <a:off x="6421246" y="7050832"/>
+            <a:off x="6421246" y="7022256"/>
             <a:ext cx="1579213" cy="261610"/>
           </a:xfrm>
           <a:prstGeom prst="rect">
@@ -7482,7 +6990,7 @@
         </p:nvSpPr>
         <p:spPr bwMode="auto">
           <a:xfrm>
-            <a:off x="2252111" y="7684756"/>
+            <a:off x="2252111" y="7627604"/>
             <a:ext cx="1847848" cy="261610"/>
           </a:xfrm>
           <a:prstGeom prst="rect">
@@ -7692,7 +7200,7 @@
           <p:nvPr/>
         </p:nvPicPr>
         <p:blipFill>
-          <a:blip r:embed="rId12">
+          <a:blip r:embed="rId18">
             <a:extLst>
               <a:ext uri="{28A0092B-C50C-407E-A947-70E740481C1C}">
                 <a14:useLocalDpi xmlns:a14="http://schemas.microsoft.com/office/drawing/2010/main" val="0"/>
@@ -7706,7 +7214,7 @@
         </p:blipFill>
         <p:spPr bwMode="auto">
           <a:xfrm>
-            <a:off x="2947435" y="7305634"/>
+            <a:off x="2947435" y="7248482"/>
             <a:ext cx="457200" cy="457200"/>
           </a:xfrm>
           <a:prstGeom prst="rect">
@@ -7753,7 +7261,7 @@
         </p:nvSpPr>
         <p:spPr bwMode="auto">
           <a:xfrm>
-            <a:off x="6286928" y="7699879"/>
+            <a:off x="6286928" y="7642727"/>
             <a:ext cx="1847848" cy="261610"/>
           </a:xfrm>
           <a:prstGeom prst="rect">
@@ -7963,7 +7471,7 @@
           <p:nvPr/>
         </p:nvPicPr>
         <p:blipFill>
-          <a:blip r:embed="rId12">
+          <a:blip r:embed="rId18">
             <a:extLst>
               <a:ext uri="{28A0092B-C50C-407E-A947-70E740481C1C}">
                 <a14:useLocalDpi xmlns:a14="http://schemas.microsoft.com/office/drawing/2010/main" val="0"/>
@@ -7977,7 +7485,7 @@
         </p:blipFill>
         <p:spPr bwMode="auto">
           <a:xfrm>
-            <a:off x="6982252" y="7320757"/>
+            <a:off x="6982252" y="7263605"/>
             <a:ext cx="457200" cy="457200"/>
           </a:xfrm>
           <a:prstGeom prst="rect">
@@ -8024,7 +7532,7 @@
         </p:nvSpPr>
         <p:spPr bwMode="auto">
           <a:xfrm>
-            <a:off x="4225566" y="5970852"/>
+            <a:off x="4225566" y="6442335"/>
             <a:ext cx="1909445" cy="430887"/>
           </a:xfrm>
           <a:prstGeom prst="rect">
@@ -8213,7 +7721,7 @@
         </p:blipFill>
         <p:spPr bwMode="auto">
           <a:xfrm>
-            <a:off x="4951688" y="5488252"/>
+            <a:off x="4951688" y="5959735"/>
             <a:ext cx="457200" cy="457200"/>
           </a:xfrm>
           <a:prstGeom prst="rect">
@@ -8579,6 +8087,509 @@
           </a:p>
         </p:txBody>
       </p:sp>
+      <p:sp>
+        <p:nvSpPr>
+          <p:cNvPr id="51" name="TextBox 26">
+            <a:extLst>
+              <a:ext uri="{FF2B5EF4-FFF2-40B4-BE49-F238E27FC236}">
+                <a16:creationId xmlns:a16="http://schemas.microsoft.com/office/drawing/2014/main" id="{E64B8CED-82C0-4168-BFB3-20ED7DA88F35}"/>
+              </a:ext>
+            </a:extLst>
+          </p:cNvPr>
+          <p:cNvSpPr txBox="1">
+            <a:spLocks noChangeArrowheads="1"/>
+          </p:cNvSpPr>
+          <p:nvPr/>
+        </p:nvSpPr>
+        <p:spPr bwMode="auto">
+          <a:xfrm>
+            <a:off x="2252111" y="5665316"/>
+            <a:ext cx="1847848" cy="430887"/>
+          </a:xfrm>
+          <a:prstGeom prst="rect">
+            <a:avLst/>
+          </a:prstGeom>
+          <a:noFill/>
+          <a:ln>
+            <a:noFill/>
+          </a:ln>
+          <a:extLst>
+            <a:ext uri="{909E8E84-426E-40DD-AFC4-6F175D3DCCD1}">
+              <a14:hiddenFill xmlns:a14="http://schemas.microsoft.com/office/drawing/2010/main">
+                <a:solidFill>
+                  <a:srgbClr val="FFFFFF"/>
+                </a:solidFill>
+              </a14:hiddenFill>
+            </a:ext>
+            <a:ext uri="{91240B29-F687-4F45-9708-019B960494DF}">
+              <a14:hiddenLine xmlns:a14="http://schemas.microsoft.com/office/drawing/2010/main" w="9525">
+                <a:solidFill>
+                  <a:srgbClr val="000000"/>
+                </a:solidFill>
+                <a:miter lim="800000"/>
+                <a:headEnd/>
+                <a:tailEnd/>
+              </a14:hiddenLine>
+            </a:ext>
+          </a:extLst>
+        </p:spPr>
+        <p:txBody>
+          <a:bodyPr wrap="square" lIns="0" rIns="0">
+            <a:spAutoFit/>
+          </a:bodyPr>
+          <a:lstStyle>
+            <a:lvl1pPr>
+              <a:defRPr>
+                <a:solidFill>
+                  <a:schemeClr val="tx1"/>
+                </a:solidFill>
+                <a:latin typeface="Calibri" panose="020F0502020204030204" pitchFamily="34" charset="0"/>
+              </a:defRPr>
+            </a:lvl1pPr>
+            <a:lvl2pPr marL="742950" indent="-285750">
+              <a:defRPr>
+                <a:solidFill>
+                  <a:schemeClr val="tx1"/>
+                </a:solidFill>
+                <a:latin typeface="Calibri" panose="020F0502020204030204" pitchFamily="34" charset="0"/>
+              </a:defRPr>
+            </a:lvl2pPr>
+            <a:lvl3pPr marL="1143000" indent="-228600">
+              <a:defRPr>
+                <a:solidFill>
+                  <a:schemeClr val="tx1"/>
+                </a:solidFill>
+                <a:latin typeface="Calibri" panose="020F0502020204030204" pitchFamily="34" charset="0"/>
+              </a:defRPr>
+            </a:lvl3pPr>
+            <a:lvl4pPr marL="1600200" indent="-228600">
+              <a:defRPr>
+                <a:solidFill>
+                  <a:schemeClr val="tx1"/>
+                </a:solidFill>
+                <a:latin typeface="Calibri" panose="020F0502020204030204" pitchFamily="34" charset="0"/>
+              </a:defRPr>
+            </a:lvl4pPr>
+            <a:lvl5pPr marL="2057400" indent="-228600">
+              <a:defRPr>
+                <a:solidFill>
+                  <a:schemeClr val="tx1"/>
+                </a:solidFill>
+                <a:latin typeface="Calibri" panose="020F0502020204030204" pitchFamily="34" charset="0"/>
+              </a:defRPr>
+            </a:lvl5pPr>
+            <a:lvl6pPr marL="2514600" indent="-228600" eaLnBrk="0" fontAlgn="base" hangingPunct="0">
+              <a:spcBef>
+                <a:spcPct val="0"/>
+              </a:spcBef>
+              <a:spcAft>
+                <a:spcPct val="0"/>
+              </a:spcAft>
+              <a:defRPr>
+                <a:solidFill>
+                  <a:schemeClr val="tx1"/>
+                </a:solidFill>
+                <a:latin typeface="Calibri" panose="020F0502020204030204" pitchFamily="34" charset="0"/>
+              </a:defRPr>
+            </a:lvl6pPr>
+            <a:lvl7pPr marL="2971800" indent="-228600" eaLnBrk="0" fontAlgn="base" hangingPunct="0">
+              <a:spcBef>
+                <a:spcPct val="0"/>
+              </a:spcBef>
+              <a:spcAft>
+                <a:spcPct val="0"/>
+              </a:spcAft>
+              <a:defRPr>
+                <a:solidFill>
+                  <a:schemeClr val="tx1"/>
+                </a:solidFill>
+                <a:latin typeface="Calibri" panose="020F0502020204030204" pitchFamily="34" charset="0"/>
+              </a:defRPr>
+            </a:lvl7pPr>
+            <a:lvl8pPr marL="3429000" indent="-228600" eaLnBrk="0" fontAlgn="base" hangingPunct="0">
+              <a:spcBef>
+                <a:spcPct val="0"/>
+              </a:spcBef>
+              <a:spcAft>
+                <a:spcPct val="0"/>
+              </a:spcAft>
+              <a:defRPr>
+                <a:solidFill>
+                  <a:schemeClr val="tx1"/>
+                </a:solidFill>
+                <a:latin typeface="Calibri" panose="020F0502020204030204" pitchFamily="34" charset="0"/>
+              </a:defRPr>
+            </a:lvl8pPr>
+            <a:lvl9pPr marL="3886200" indent="-228600" eaLnBrk="0" fontAlgn="base" hangingPunct="0">
+              <a:spcBef>
+                <a:spcPct val="0"/>
+              </a:spcBef>
+              <a:spcAft>
+                <a:spcPct val="0"/>
+              </a:spcAft>
+              <a:defRPr>
+                <a:solidFill>
+                  <a:schemeClr val="tx1"/>
+                </a:solidFill>
+                <a:latin typeface="Calibri" panose="020F0502020204030204" pitchFamily="34" charset="0"/>
+              </a:defRPr>
+            </a:lvl9pPr>
+          </a:lstStyle>
+          <a:p>
+            <a:pPr marL="0" marR="0" lvl="0" indent="0" algn="ctr" defTabSz="457200" rtl="0" eaLnBrk="1" fontAlgn="auto" latinLnBrk="0" hangingPunct="1">
+              <a:lnSpc>
+                <a:spcPct val="100000"/>
+              </a:lnSpc>
+              <a:spcBef>
+                <a:spcPts val="0"/>
+              </a:spcBef>
+              <a:spcAft>
+                <a:spcPts val="0"/>
+              </a:spcAft>
+              <a:buClrTx/>
+              <a:buSzTx/>
+              <a:buFontTx/>
+              <a:buNone/>
+              <a:tabLst/>
+              <a:defRPr/>
+            </a:pPr>
+            <a:r>
+              <a:rPr kumimoji="0" lang="en-US" altLang="en-US" sz="1100" b="0" i="0" u="none" strike="noStrike" kern="1200" cap="none" spc="0" normalizeH="0" baseline="0" noProof="0" dirty="0">
+                <a:ln>
+                  <a:noFill/>
+                </a:ln>
+                <a:solidFill>
+                  <a:prstClr val="black"/>
+                </a:solidFill>
+                <a:effectLst/>
+                <a:uLnTx/>
+                <a:uFillTx/>
+                <a:latin typeface="Arial" panose="020B0604020202020204" pitchFamily="34" charset="0"/>
+                <a:ea typeface="Amazon Ember" panose="020B0603020204020204" pitchFamily="34" charset="0"/>
+                <a:cs typeface="Arial" panose="020B0604020202020204" pitchFamily="34" charset="0"/>
+              </a:rPr>
+              <a:t>IBM WebSphere Liberty operator</a:t>
+            </a:r>
+          </a:p>
+        </p:txBody>
+      </p:sp>
+      <p:pic>
+        <p:nvPicPr>
+          <p:cNvPr id="52" name="Graphic 34">
+            <a:extLst>
+              <a:ext uri="{FF2B5EF4-FFF2-40B4-BE49-F238E27FC236}">
+                <a16:creationId xmlns:a16="http://schemas.microsoft.com/office/drawing/2014/main" id="{7376B7E1-3F14-4F70-B913-A84346193F2D}"/>
+              </a:ext>
+            </a:extLst>
+          </p:cNvPr>
+          <p:cNvPicPr>
+            <a:picLocks noChangeAspect="1" noChangeArrowheads="1"/>
+          </p:cNvPicPr>
+          <p:nvPr/>
+        </p:nvPicPr>
+        <p:blipFill>
+          <a:blip r:embed="rId18">
+            <a:extLst>
+              <a:ext uri="{28A0092B-C50C-407E-A947-70E740481C1C}">
+                <a14:useLocalDpi xmlns:a14="http://schemas.microsoft.com/office/drawing/2010/main" val="0"/>
+              </a:ext>
+            </a:extLst>
+          </a:blip>
+          <a:srcRect/>
+          <a:stretch>
+            <a:fillRect/>
+          </a:stretch>
+        </p:blipFill>
+        <p:spPr bwMode="auto">
+          <a:xfrm>
+            <a:off x="2947435" y="5300482"/>
+            <a:ext cx="457200" cy="457200"/>
+          </a:xfrm>
+          <a:prstGeom prst="rect">
+            <a:avLst/>
+          </a:prstGeom>
+          <a:noFill/>
+          <a:ln>
+            <a:noFill/>
+          </a:ln>
+          <a:extLst>
+            <a:ext uri="{909E8E84-426E-40DD-AFC4-6F175D3DCCD1}">
+              <a14:hiddenFill xmlns:a14="http://schemas.microsoft.com/office/drawing/2010/main">
+                <a:solidFill>
+                  <a:srgbClr val="FFFFFF"/>
+                </a:solidFill>
+              </a14:hiddenFill>
+            </a:ext>
+            <a:ext uri="{91240B29-F687-4F45-9708-019B960494DF}">
+              <a14:hiddenLine xmlns:a14="http://schemas.microsoft.com/office/drawing/2010/main" w="9525">
+                <a:solidFill>
+                  <a:srgbClr val="000000"/>
+                </a:solidFill>
+                <a:miter lim="800000"/>
+                <a:headEnd/>
+                <a:tailEnd/>
+              </a14:hiddenLine>
+            </a:ext>
+          </a:extLst>
+        </p:spPr>
+      </p:pic>
+      <p:sp>
+        <p:nvSpPr>
+          <p:cNvPr id="54" name="TextBox 26">
+            <a:extLst>
+              <a:ext uri="{FF2B5EF4-FFF2-40B4-BE49-F238E27FC236}">
+                <a16:creationId xmlns:a16="http://schemas.microsoft.com/office/drawing/2014/main" id="{D07EC00E-CB83-4C5F-A184-E9040FB1447C}"/>
+              </a:ext>
+            </a:extLst>
+          </p:cNvPr>
+          <p:cNvSpPr txBox="1">
+            <a:spLocks noChangeArrowheads="1"/>
+          </p:cNvSpPr>
+          <p:nvPr/>
+        </p:nvSpPr>
+        <p:spPr bwMode="auto">
+          <a:xfrm>
+            <a:off x="6286928" y="5665316"/>
+            <a:ext cx="1847848" cy="430887"/>
+          </a:xfrm>
+          <a:prstGeom prst="rect">
+            <a:avLst/>
+          </a:prstGeom>
+          <a:noFill/>
+          <a:ln>
+            <a:noFill/>
+          </a:ln>
+          <a:extLst>
+            <a:ext uri="{909E8E84-426E-40DD-AFC4-6F175D3DCCD1}">
+              <a14:hiddenFill xmlns:a14="http://schemas.microsoft.com/office/drawing/2010/main">
+                <a:solidFill>
+                  <a:srgbClr val="FFFFFF"/>
+                </a:solidFill>
+              </a14:hiddenFill>
+            </a:ext>
+            <a:ext uri="{91240B29-F687-4F45-9708-019B960494DF}">
+              <a14:hiddenLine xmlns:a14="http://schemas.microsoft.com/office/drawing/2010/main" w="9525">
+                <a:solidFill>
+                  <a:srgbClr val="000000"/>
+                </a:solidFill>
+                <a:miter lim="800000"/>
+                <a:headEnd/>
+                <a:tailEnd/>
+              </a14:hiddenLine>
+            </a:ext>
+          </a:extLst>
+        </p:spPr>
+        <p:txBody>
+          <a:bodyPr wrap="square" lIns="0" rIns="0">
+            <a:spAutoFit/>
+          </a:bodyPr>
+          <a:lstStyle>
+            <a:lvl1pPr>
+              <a:defRPr>
+                <a:solidFill>
+                  <a:schemeClr val="tx1"/>
+                </a:solidFill>
+                <a:latin typeface="Calibri" panose="020F0502020204030204" pitchFamily="34" charset="0"/>
+              </a:defRPr>
+            </a:lvl1pPr>
+            <a:lvl2pPr marL="742950" indent="-285750">
+              <a:defRPr>
+                <a:solidFill>
+                  <a:schemeClr val="tx1"/>
+                </a:solidFill>
+                <a:latin typeface="Calibri" panose="020F0502020204030204" pitchFamily="34" charset="0"/>
+              </a:defRPr>
+            </a:lvl2pPr>
+            <a:lvl3pPr marL="1143000" indent="-228600">
+              <a:defRPr>
+                <a:solidFill>
+                  <a:schemeClr val="tx1"/>
+                </a:solidFill>
+                <a:latin typeface="Calibri" panose="020F0502020204030204" pitchFamily="34" charset="0"/>
+              </a:defRPr>
+            </a:lvl3pPr>
+            <a:lvl4pPr marL="1600200" indent="-228600">
+              <a:defRPr>
+                <a:solidFill>
+                  <a:schemeClr val="tx1"/>
+                </a:solidFill>
+                <a:latin typeface="Calibri" panose="020F0502020204030204" pitchFamily="34" charset="0"/>
+              </a:defRPr>
+            </a:lvl4pPr>
+            <a:lvl5pPr marL="2057400" indent="-228600">
+              <a:defRPr>
+                <a:solidFill>
+                  <a:schemeClr val="tx1"/>
+                </a:solidFill>
+                <a:latin typeface="Calibri" panose="020F0502020204030204" pitchFamily="34" charset="0"/>
+              </a:defRPr>
+            </a:lvl5pPr>
+            <a:lvl6pPr marL="2514600" indent="-228600" eaLnBrk="0" fontAlgn="base" hangingPunct="0">
+              <a:spcBef>
+                <a:spcPct val="0"/>
+              </a:spcBef>
+              <a:spcAft>
+                <a:spcPct val="0"/>
+              </a:spcAft>
+              <a:defRPr>
+                <a:solidFill>
+                  <a:schemeClr val="tx1"/>
+                </a:solidFill>
+                <a:latin typeface="Calibri" panose="020F0502020204030204" pitchFamily="34" charset="0"/>
+              </a:defRPr>
+            </a:lvl6pPr>
+            <a:lvl7pPr marL="2971800" indent="-228600" eaLnBrk="0" fontAlgn="base" hangingPunct="0">
+              <a:spcBef>
+                <a:spcPct val="0"/>
+              </a:spcBef>
+              <a:spcAft>
+                <a:spcPct val="0"/>
+              </a:spcAft>
+              <a:defRPr>
+                <a:solidFill>
+                  <a:schemeClr val="tx1"/>
+                </a:solidFill>
+                <a:latin typeface="Calibri" panose="020F0502020204030204" pitchFamily="34" charset="0"/>
+              </a:defRPr>
+            </a:lvl7pPr>
+            <a:lvl8pPr marL="3429000" indent="-228600" eaLnBrk="0" fontAlgn="base" hangingPunct="0">
+              <a:spcBef>
+                <a:spcPct val="0"/>
+              </a:spcBef>
+              <a:spcAft>
+                <a:spcPct val="0"/>
+              </a:spcAft>
+              <a:defRPr>
+                <a:solidFill>
+                  <a:schemeClr val="tx1"/>
+                </a:solidFill>
+                <a:latin typeface="Calibri" panose="020F0502020204030204" pitchFamily="34" charset="0"/>
+              </a:defRPr>
+            </a:lvl8pPr>
+            <a:lvl9pPr marL="3886200" indent="-228600" eaLnBrk="0" fontAlgn="base" hangingPunct="0">
+              <a:spcBef>
+                <a:spcPct val="0"/>
+              </a:spcBef>
+              <a:spcAft>
+                <a:spcPct val="0"/>
+              </a:spcAft>
+              <a:defRPr>
+                <a:solidFill>
+                  <a:schemeClr val="tx1"/>
+                </a:solidFill>
+                <a:latin typeface="Calibri" panose="020F0502020204030204" pitchFamily="34" charset="0"/>
+              </a:defRPr>
+            </a:lvl9pPr>
+          </a:lstStyle>
+          <a:p>
+            <a:pPr marL="0" marR="0" lvl="0" indent="0" algn="ctr" defTabSz="457200" rtl="0" eaLnBrk="1" fontAlgn="auto" latinLnBrk="0" hangingPunct="1">
+              <a:lnSpc>
+                <a:spcPct val="100000"/>
+              </a:lnSpc>
+              <a:spcBef>
+                <a:spcPts val="0"/>
+              </a:spcBef>
+              <a:spcAft>
+                <a:spcPts val="0"/>
+              </a:spcAft>
+              <a:buClrTx/>
+              <a:buSzTx/>
+              <a:buFontTx/>
+              <a:buNone/>
+              <a:tabLst/>
+              <a:defRPr/>
+            </a:pPr>
+            <a:r>
+              <a:rPr lang="en-US" altLang="en-US" sz="1100" dirty="0">
+                <a:solidFill>
+                  <a:prstClr val="black"/>
+                </a:solidFill>
+                <a:latin typeface="Arial" panose="020B0604020202020204" pitchFamily="34" charset="0"/>
+                <a:ea typeface="Amazon Ember" panose="020B0603020204020204" pitchFamily="34" charset="0"/>
+                <a:cs typeface="Arial" panose="020B0604020202020204" pitchFamily="34" charset="0"/>
+              </a:rPr>
+              <a:t>IBM </a:t>
+            </a:r>
+            <a:r>
+              <a:rPr kumimoji="0" lang="en-US" altLang="en-US" sz="1100" b="0" i="0" u="none" strike="noStrike" kern="1200" cap="none" spc="0" normalizeH="0" baseline="0" noProof="0" dirty="0">
+                <a:ln>
+                  <a:noFill/>
+                </a:ln>
+                <a:solidFill>
+                  <a:prstClr val="black"/>
+                </a:solidFill>
+                <a:effectLst/>
+                <a:uLnTx/>
+                <a:uFillTx/>
+                <a:latin typeface="Arial" panose="020B0604020202020204" pitchFamily="34" charset="0"/>
+                <a:ea typeface="Amazon Ember" panose="020B0603020204020204" pitchFamily="34" charset="0"/>
+                <a:cs typeface="Arial" panose="020B0604020202020204" pitchFamily="34" charset="0"/>
+              </a:rPr>
+              <a:t>WebSphere Liberty operator</a:t>
+            </a:r>
+          </a:p>
+        </p:txBody>
+      </p:sp>
+      <p:pic>
+        <p:nvPicPr>
+          <p:cNvPr id="57" name="Graphic 34">
+            <a:extLst>
+              <a:ext uri="{FF2B5EF4-FFF2-40B4-BE49-F238E27FC236}">
+                <a16:creationId xmlns:a16="http://schemas.microsoft.com/office/drawing/2014/main" id="{2F20C17C-F836-456B-BE99-04B4CA24F3AD}"/>
+              </a:ext>
+            </a:extLst>
+          </p:cNvPr>
+          <p:cNvPicPr>
+            <a:picLocks noChangeAspect="1" noChangeArrowheads="1"/>
+          </p:cNvPicPr>
+          <p:nvPr/>
+        </p:nvPicPr>
+        <p:blipFill>
+          <a:blip r:embed="rId18">
+            <a:extLst>
+              <a:ext uri="{28A0092B-C50C-407E-A947-70E740481C1C}">
+                <a14:useLocalDpi xmlns:a14="http://schemas.microsoft.com/office/drawing/2010/main" val="0"/>
+              </a:ext>
+            </a:extLst>
+          </a:blip>
+          <a:srcRect/>
+          <a:stretch>
+            <a:fillRect/>
+          </a:stretch>
+        </p:blipFill>
+        <p:spPr bwMode="auto">
+          <a:xfrm>
+            <a:off x="6982252" y="5305821"/>
+            <a:ext cx="457200" cy="457200"/>
+          </a:xfrm>
+          <a:prstGeom prst="rect">
+            <a:avLst/>
+          </a:prstGeom>
+          <a:noFill/>
+          <a:ln>
+            <a:noFill/>
+          </a:ln>
+          <a:extLst>
+            <a:ext uri="{909E8E84-426E-40DD-AFC4-6F175D3DCCD1}">
+              <a14:hiddenFill xmlns:a14="http://schemas.microsoft.com/office/drawing/2010/main">
+                <a:solidFill>
+                  <a:srgbClr val="FFFFFF"/>
+                </a:solidFill>
+              </a14:hiddenFill>
+            </a:ext>
+            <a:ext uri="{91240B29-F687-4F45-9708-019B960494DF}">
+              <a14:hiddenLine xmlns:a14="http://schemas.microsoft.com/office/drawing/2010/main" w="9525">
+                <a:solidFill>
+                  <a:srgbClr val="000000"/>
+                </a:solidFill>
+                <a:miter lim="800000"/>
+                <a:headEnd/>
+                <a:tailEnd/>
+              </a14:hiddenLine>
+            </a:ext>
+          </a:extLst>
+        </p:spPr>
+      </p:pic>
     </p:spTree>
     <p:extLst>
       <p:ext uri="{BB962C8B-B14F-4D97-AF65-F5344CB8AC3E}">

</xml_diff>